<commit_message>
Revert "correction small typo"
This reverts commit 6706640f6aba22571bda80b76438d2543177be2f.
</commit_message>
<xml_diff>
--- a/Report/Presentation_final.pptx
+++ b/Report/Presentation_final.pptx
@@ -7613,13 +7613,6 @@
   <p:clrMapOvr>
     <a:masterClrMapping/>
   </p:clrMapOvr>
-  <p:timing>
-    <p:tnLst>
-      <p:par>
-        <p:cTn id="1" dur="indefinite" restart="never" nodeType="tmRoot"/>
-      </p:par>
-    </p:tnLst>
-  </p:timing>
 </p:sld>
 </file>
 
@@ -11560,8 +11553,8 @@
           </p:sp>
         </mc:Fallback>
       </mc:AlternateContent>
-      <mc:AlternateContent xmlns:mc="http://schemas.openxmlformats.org/markup-compatibility/2006">
-        <mc:Choice xmlns:a14="http://schemas.microsoft.com/office/drawing/2010/main" Requires="a14">
+      <mc:AlternateContent xmlns:mc="http://schemas.openxmlformats.org/markup-compatibility/2006" xmlns:a14="http://schemas.microsoft.com/office/drawing/2010/main">
+        <mc:Choice Requires="a14">
           <p:sp>
             <p:nvSpPr>
               <p:cNvPr id="16" name="TextBox 15"/>
@@ -11712,11 +11705,10 @@
                                 </m:e>
                                 <m:sub>
                                   <m:r>
-                                    <a:rPr lang="fr-FR" b="0" i="1" smtClean="0">
+                                    <a:rPr lang="fr-FR" i="1">
                                       <a:latin typeface="Cambria Math" panose="02040503050406030204" pitchFamily="18" charset="0"/>
-                                      <a:ea typeface="Cambria Math" panose="02040503050406030204" pitchFamily="18" charset="0"/>
                                     </a:rPr>
-                                    <m:t>𝑗</m:t>
+                                    <m:t>𝑖</m:t>
                                   </m:r>
                                 </m:sub>
                                 <m:sup>
@@ -11740,7 +11732,7 @@
             </p:txBody>
           </p:sp>
         </mc:Choice>
-        <mc:Fallback>
+        <mc:Fallback xmlns="">
           <p:sp>
             <p:nvSpPr>
               <p:cNvPr id="16" name="TextBox 15"/>
@@ -11769,7 +11761,7 @@
               <a:lstStyle/>
               <a:p>
                 <a:r>
-                  <a:rPr lang="fr-FR">
+                  <a:rPr lang="en-US">
                     <a:noFill/>
                   </a:rPr>
                   <a:t> </a:t>

</xml_diff>